<commit_message>
Update Decision Making slides.pptx
</commit_message>
<xml_diff>
--- a/R/Decision Making slides.pptx
+++ b/R/Decision Making slides.pptx
@@ -270,7 +270,7 @@
           <a:p>
             <a:fld id="{FD2E41BA-F14B-49FC-83F3-F6A240803BD9}" type="datetimeFigureOut">
               <a:rPr lang="it-IT" smtClean="0"/>
-              <a:t>10/02/22</a:t>
+              <a:t>10/02/2022</a:t>
             </a:fld>
             <a:endParaRPr lang="it-IT" dirty="0"/>
           </a:p>
@@ -468,7 +468,7 @@
           <a:p>
             <a:fld id="{FD2E41BA-F14B-49FC-83F3-F6A240803BD9}" type="datetimeFigureOut">
               <a:rPr lang="it-IT" smtClean="0"/>
-              <a:t>10/02/22</a:t>
+              <a:t>10/02/2022</a:t>
             </a:fld>
             <a:endParaRPr lang="it-IT" dirty="0"/>
           </a:p>
@@ -676,7 +676,7 @@
           <a:p>
             <a:fld id="{FD2E41BA-F14B-49FC-83F3-F6A240803BD9}" type="datetimeFigureOut">
               <a:rPr lang="it-IT" smtClean="0"/>
-              <a:t>10/02/22</a:t>
+              <a:t>10/02/2022</a:t>
             </a:fld>
             <a:endParaRPr lang="it-IT" dirty="0"/>
           </a:p>
@@ -874,7 +874,7 @@
           <a:p>
             <a:fld id="{FD2E41BA-F14B-49FC-83F3-F6A240803BD9}" type="datetimeFigureOut">
               <a:rPr lang="it-IT" smtClean="0"/>
-              <a:t>10/02/22</a:t>
+              <a:t>10/02/2022</a:t>
             </a:fld>
             <a:endParaRPr lang="it-IT" dirty="0"/>
           </a:p>
@@ -1149,7 +1149,7 @@
           <a:p>
             <a:fld id="{FD2E41BA-F14B-49FC-83F3-F6A240803BD9}" type="datetimeFigureOut">
               <a:rPr lang="it-IT" smtClean="0"/>
-              <a:t>10/02/22</a:t>
+              <a:t>10/02/2022</a:t>
             </a:fld>
             <a:endParaRPr lang="it-IT" dirty="0"/>
           </a:p>
@@ -1414,7 +1414,7 @@
           <a:p>
             <a:fld id="{FD2E41BA-F14B-49FC-83F3-F6A240803BD9}" type="datetimeFigureOut">
               <a:rPr lang="it-IT" smtClean="0"/>
-              <a:t>10/02/22</a:t>
+              <a:t>10/02/2022</a:t>
             </a:fld>
             <a:endParaRPr lang="it-IT" dirty="0"/>
           </a:p>
@@ -1826,7 +1826,7 @@
           <a:p>
             <a:fld id="{FD2E41BA-F14B-49FC-83F3-F6A240803BD9}" type="datetimeFigureOut">
               <a:rPr lang="it-IT" smtClean="0"/>
-              <a:t>10/02/22</a:t>
+              <a:t>10/02/2022</a:t>
             </a:fld>
             <a:endParaRPr lang="it-IT" dirty="0"/>
           </a:p>
@@ -1967,7 +1967,7 @@
           <a:p>
             <a:fld id="{FD2E41BA-F14B-49FC-83F3-F6A240803BD9}" type="datetimeFigureOut">
               <a:rPr lang="it-IT" smtClean="0"/>
-              <a:t>10/02/22</a:t>
+              <a:t>10/02/2022</a:t>
             </a:fld>
             <a:endParaRPr lang="it-IT" dirty="0"/>
           </a:p>
@@ -2080,7 +2080,7 @@
           <a:p>
             <a:fld id="{FD2E41BA-F14B-49FC-83F3-F6A240803BD9}" type="datetimeFigureOut">
               <a:rPr lang="it-IT" smtClean="0"/>
-              <a:t>10/02/22</a:t>
+              <a:t>10/02/2022</a:t>
             </a:fld>
             <a:endParaRPr lang="it-IT" dirty="0"/>
           </a:p>
@@ -2391,7 +2391,7 @@
           <a:p>
             <a:fld id="{FD2E41BA-F14B-49FC-83F3-F6A240803BD9}" type="datetimeFigureOut">
               <a:rPr lang="it-IT" smtClean="0"/>
-              <a:t>10/02/22</a:t>
+              <a:t>10/02/2022</a:t>
             </a:fld>
             <a:endParaRPr lang="it-IT" dirty="0"/>
           </a:p>
@@ -2679,7 +2679,7 @@
           <a:p>
             <a:fld id="{FD2E41BA-F14B-49FC-83F3-F6A240803BD9}" type="datetimeFigureOut">
               <a:rPr lang="it-IT" smtClean="0"/>
-              <a:t>10/02/22</a:t>
+              <a:t>10/02/2022</a:t>
             </a:fld>
             <a:endParaRPr lang="it-IT" dirty="0"/>
           </a:p>
@@ -2920,7 +2920,7 @@
           <a:p>
             <a:fld id="{FD2E41BA-F14B-49FC-83F3-F6A240803BD9}" type="datetimeFigureOut">
               <a:rPr lang="it-IT" smtClean="0"/>
-              <a:t>10/02/22</a:t>
+              <a:t>10/02/2022</a:t>
             </a:fld>
             <a:endParaRPr lang="it-IT" dirty="0"/>
           </a:p>
@@ -4192,10 +4192,7 @@
             </a:lvl9pPr>
           </a:lstStyle>
           <a:p>
-            <a:r>
-              <a:rPr lang="en-US" sz="2000" dirty="0"/>
-              <a:t>aaa</a:t>
-            </a:r>
+            <a:endParaRPr lang="en-US" sz="2000" dirty="0"/>
           </a:p>
         </p:txBody>
       </p:sp>
@@ -4885,10 +4882,7 @@
             </a:lvl9pPr>
           </a:lstStyle>
           <a:p>
-            <a:r>
-              <a:rPr lang="en-US" sz="2000" dirty="0"/>
-              <a:t>aaa</a:t>
-            </a:r>
+            <a:endParaRPr lang="en-US" sz="2000" dirty="0"/>
           </a:p>
         </p:txBody>
       </p:sp>
@@ -5242,6 +5236,47 @@
           </p:txBody>
         </p:sp>
       </p:grpSp>
+      <p:sp>
+        <p:nvSpPr>
+          <p:cNvPr id="4" name="CasellaDiTesto 3">
+            <a:extLst>
+              <a:ext uri="{FF2B5EF4-FFF2-40B4-BE49-F238E27FC236}">
+                <a16:creationId xmlns:a16="http://schemas.microsoft.com/office/drawing/2014/main" id="{3415ECF3-FA5E-4C27-A88E-237D788F08AF}"/>
+              </a:ext>
+            </a:extLst>
+          </p:cNvPr>
+          <p:cNvSpPr txBox="1"/>
+          <p:nvPr/>
+        </p:nvSpPr>
+        <p:spPr>
+          <a:xfrm>
+            <a:off x="783771" y="1782981"/>
+            <a:ext cx="4329405" cy="1200329"/>
+          </a:xfrm>
+          <a:prstGeom prst="rect">
+            <a:avLst/>
+          </a:prstGeom>
+          <a:noFill/>
+        </p:spPr>
+        <p:txBody>
+          <a:bodyPr wrap="square" rtlCol="0">
+            <a:spAutoFit/>
+          </a:bodyPr>
+          <a:lstStyle/>
+          <a:p>
+            <a:r>
+              <a:rPr lang="it-IT" dirty="0"/>
+              <a:t>Abbiamo implementato la funzione GA attraverso R.</a:t>
+            </a:r>
+          </a:p>
+          <a:p>
+            <a:endParaRPr lang="it-IT" dirty="0"/>
+          </a:p>
+          <a:p>
+            <a:endParaRPr lang="it-IT" dirty="0"/>
+          </a:p>
+        </p:txBody>
+      </p:sp>
     </p:spTree>
     <p:extLst>
       <p:ext uri="{BB962C8B-B14F-4D97-AF65-F5344CB8AC3E}">
@@ -10903,9 +10938,282 @@
             </a:lvl9pPr>
           </a:lstStyle>
           <a:p>
+            <a:pPr marL="0" indent="0">
+              <a:buNone/>
+            </a:pPr>
             <a:r>
               <a:rPr lang="en-US" sz="2000" dirty="0"/>
-              <a:t>motivo</a:t>
+              <a:t>Per </a:t>
+            </a:r>
+            <a:r>
+              <a:rPr lang="en-US" sz="2000" dirty="0" err="1"/>
+              <a:t>superare</a:t>
+            </a:r>
+            <a:r>
+              <a:rPr lang="en-US" sz="2000" dirty="0"/>
+              <a:t> I </a:t>
+            </a:r>
+            <a:r>
+              <a:rPr lang="en-US" sz="2000" dirty="0" err="1"/>
+              <a:t>limiti</a:t>
+            </a:r>
+            <a:r>
+              <a:rPr lang="en-US" sz="2000" dirty="0"/>
+              <a:t> </a:t>
+            </a:r>
+            <a:r>
+              <a:rPr lang="en-US" sz="2000" dirty="0" err="1"/>
+              <a:t>dei</a:t>
+            </a:r>
+            <a:r>
+              <a:rPr lang="en-US" sz="2000" dirty="0"/>
+              <a:t> due </a:t>
+            </a:r>
+            <a:r>
+              <a:rPr lang="en-US" sz="2000" dirty="0" err="1"/>
+              <a:t>metodi</a:t>
+            </a:r>
+            <a:r>
+              <a:rPr lang="en-US" sz="2000" dirty="0"/>
+              <a:t> </a:t>
+            </a:r>
+            <a:r>
+              <a:rPr lang="en-US" sz="2000" dirty="0" err="1"/>
+              <a:t>abbiamo</a:t>
+            </a:r>
+            <a:r>
+              <a:rPr lang="en-US" sz="2000" dirty="0"/>
+              <a:t> </a:t>
+            </a:r>
+            <a:r>
+              <a:rPr lang="en-US" sz="2000" dirty="0" err="1"/>
+              <a:t>provato</a:t>
+            </a:r>
+            <a:r>
+              <a:rPr lang="en-US" sz="2000" dirty="0"/>
+              <a:t> ad </a:t>
+            </a:r>
+            <a:r>
+              <a:rPr lang="en-US" sz="2000" dirty="0" err="1"/>
+              <a:t>implementarli</a:t>
+            </a:r>
+            <a:r>
+              <a:rPr lang="en-US" sz="2000" dirty="0"/>
+              <a:t> </a:t>
+            </a:r>
+            <a:r>
+              <a:rPr lang="en-US" sz="2000" dirty="0" err="1"/>
+              <a:t>consecutivamente</a:t>
+            </a:r>
+            <a:r>
+              <a:rPr lang="en-US" sz="2000" dirty="0"/>
+              <a:t>. </a:t>
+            </a:r>
+          </a:p>
+          <a:p>
+            <a:pPr marL="0" indent="0">
+              <a:buNone/>
+            </a:pPr>
+            <a:r>
+              <a:rPr lang="en-US" sz="2000" dirty="0" err="1"/>
+              <a:t>Quindi</a:t>
+            </a:r>
+            <a:r>
+              <a:rPr lang="en-US" sz="2000" dirty="0"/>
+              <a:t> </a:t>
+            </a:r>
+            <a:r>
+              <a:rPr lang="en-US" sz="2000" dirty="0" err="1"/>
+              <a:t>attraverso</a:t>
+            </a:r>
+            <a:r>
+              <a:rPr lang="en-US" sz="2000" dirty="0"/>
+              <a:t> </a:t>
+            </a:r>
+            <a:r>
+              <a:rPr lang="en-US" sz="2000" dirty="0" err="1"/>
+              <a:t>l’algoritmo</a:t>
+            </a:r>
+            <a:r>
+              <a:rPr lang="en-US" sz="2000" dirty="0"/>
+              <a:t> A </a:t>
+            </a:r>
+            <a:r>
+              <a:rPr lang="en-US" sz="2000" dirty="0" err="1"/>
+              <a:t>abbiamo</a:t>
+            </a:r>
+            <a:r>
+              <a:rPr lang="en-US" sz="2000" dirty="0"/>
+              <a:t> </a:t>
+            </a:r>
+            <a:r>
+              <a:rPr lang="en-US" sz="2000" dirty="0" err="1"/>
+              <a:t>esplorato</a:t>
+            </a:r>
+            <a:r>
+              <a:rPr lang="en-US" sz="2000" dirty="0"/>
+              <a:t> la </a:t>
+            </a:r>
+            <a:r>
+              <a:rPr lang="en-US" sz="2000" dirty="0" err="1"/>
+              <a:t>funzione</a:t>
+            </a:r>
+            <a:r>
+              <a:rPr lang="en-US" sz="2000" dirty="0"/>
+              <a:t> per </a:t>
+            </a:r>
+            <a:r>
+              <a:rPr lang="en-US" sz="2000" dirty="0" err="1"/>
+              <a:t>avvicinarci</a:t>
+            </a:r>
+            <a:r>
+              <a:rPr lang="en-US" sz="2000" dirty="0"/>
+              <a:t> </a:t>
+            </a:r>
+            <a:r>
+              <a:rPr lang="en-US" sz="2000" dirty="0" err="1"/>
+              <a:t>all’ottimo</a:t>
+            </a:r>
+            <a:r>
+              <a:rPr lang="en-US" sz="2000" dirty="0"/>
+              <a:t> </a:t>
+            </a:r>
+            <a:r>
+              <a:rPr lang="en-US" sz="2000" dirty="0" err="1"/>
+              <a:t>globale</a:t>
+            </a:r>
+            <a:r>
+              <a:rPr lang="en-US" sz="2000" dirty="0"/>
+              <a:t>.</a:t>
+            </a:r>
+          </a:p>
+          <a:p>
+            <a:pPr marL="0" indent="0">
+              <a:buNone/>
+            </a:pPr>
+            <a:r>
+              <a:rPr lang="en-US" sz="2000" dirty="0"/>
+              <a:t>Sui </a:t>
+            </a:r>
+            <a:r>
+              <a:rPr lang="en-US" sz="2000" dirty="0" err="1"/>
+              <a:t>risultati</a:t>
+            </a:r>
+            <a:r>
+              <a:rPr lang="en-US" sz="2000" dirty="0"/>
+              <a:t> </a:t>
+            </a:r>
+            <a:r>
+              <a:rPr lang="en-US" sz="2000" dirty="0" err="1"/>
+              <a:t>ottenuti</a:t>
+            </a:r>
+            <a:r>
+              <a:rPr lang="en-US" sz="2000" dirty="0"/>
+              <a:t> </a:t>
+            </a:r>
+            <a:r>
+              <a:rPr lang="en-US" sz="2000" dirty="0" err="1"/>
+              <a:t>attraverso</a:t>
+            </a:r>
+            <a:r>
+              <a:rPr lang="en-US" sz="2000" dirty="0"/>
+              <a:t> </a:t>
+            </a:r>
+            <a:r>
+              <a:rPr lang="en-US" sz="2000" dirty="0" err="1"/>
+              <a:t>l’algoritmo</a:t>
+            </a:r>
+            <a:r>
+              <a:rPr lang="en-US" sz="2000" dirty="0"/>
+              <a:t> A, </a:t>
+            </a:r>
+            <a:r>
+              <a:rPr lang="en-US" sz="2000" dirty="0" err="1"/>
+              <a:t>abbiamo</a:t>
+            </a:r>
+            <a:r>
+              <a:rPr lang="en-US" sz="2000" dirty="0"/>
+              <a:t> </a:t>
+            </a:r>
+            <a:r>
+              <a:rPr lang="en-US" sz="2000" dirty="0" err="1"/>
+              <a:t>implementato</a:t>
+            </a:r>
+            <a:r>
+              <a:rPr lang="en-US" sz="2000" dirty="0"/>
+              <a:t> </a:t>
+            </a:r>
+            <a:r>
+              <a:rPr lang="en-US" sz="2000" dirty="0" err="1"/>
+              <a:t>l’algoritmo</a:t>
+            </a:r>
+            <a:r>
+              <a:rPr lang="en-US" sz="2000" dirty="0"/>
+              <a:t> B per </a:t>
+            </a:r>
+            <a:r>
+              <a:rPr lang="en-US" sz="2000" dirty="0" err="1"/>
+              <a:t>verificare</a:t>
+            </a:r>
+            <a:r>
+              <a:rPr lang="en-US" sz="2000" dirty="0"/>
+              <a:t> se, </a:t>
+            </a:r>
+            <a:r>
+              <a:rPr lang="en-US" sz="2000" dirty="0" err="1"/>
+              <a:t>esplorando</a:t>
+            </a:r>
+            <a:r>
+              <a:rPr lang="en-US" sz="2000" dirty="0"/>
+              <a:t> </a:t>
+            </a:r>
+            <a:r>
+              <a:rPr lang="en-US" sz="2000" dirty="0" err="1"/>
+              <a:t>l’intorno</a:t>
+            </a:r>
+            <a:r>
+              <a:rPr lang="en-US" sz="2000" dirty="0"/>
+              <a:t> di </a:t>
+            </a:r>
+            <a:r>
+              <a:rPr lang="en-US" sz="2000" dirty="0" err="1"/>
+              <a:t>tali</a:t>
+            </a:r>
+            <a:r>
+              <a:rPr lang="en-US" sz="2000" dirty="0"/>
+              <a:t> </a:t>
+            </a:r>
+            <a:r>
+              <a:rPr lang="en-US" sz="2000" dirty="0" err="1"/>
+              <a:t>punti</a:t>
+            </a:r>
+            <a:r>
+              <a:rPr lang="en-US" sz="2000" dirty="0"/>
+              <a:t>, I </a:t>
+            </a:r>
+            <a:r>
+              <a:rPr lang="en-US" sz="2000" dirty="0" err="1"/>
+              <a:t>risultati</a:t>
+            </a:r>
+            <a:r>
+              <a:rPr lang="en-US" sz="2000" dirty="0"/>
+              <a:t> </a:t>
+            </a:r>
+            <a:r>
+              <a:rPr lang="en-US" sz="2000" dirty="0" err="1"/>
+              <a:t>convergessero</a:t>
+            </a:r>
+            <a:r>
+              <a:rPr lang="en-US" sz="2000" dirty="0"/>
+              <a:t> in unica </a:t>
+            </a:r>
+            <a:r>
+              <a:rPr lang="en-US" sz="2000" dirty="0" err="1"/>
+              <a:t>soluzione</a:t>
+            </a:r>
+            <a:r>
+              <a:rPr lang="en-US" sz="2000" dirty="0"/>
+              <a:t>.</a:t>
             </a:r>
           </a:p>
         </p:txBody>

</xml_diff>

<commit_message>
In teoria manca solo FDSA
</commit_message>
<xml_diff>
--- a/R/Decision Making slides.pptx
+++ b/R/Decision Making slides.pptx
@@ -270,7 +270,7 @@
           <a:p>
             <a:fld id="{FD2E41BA-F14B-49FC-83F3-F6A240803BD9}" type="datetimeFigureOut">
               <a:rPr lang="it-IT" smtClean="0"/>
-              <a:t>10/02/2022</a:t>
+              <a:t>10/02/22</a:t>
             </a:fld>
             <a:endParaRPr lang="it-IT" dirty="0"/>
           </a:p>
@@ -468,7 +468,7 @@
           <a:p>
             <a:fld id="{FD2E41BA-F14B-49FC-83F3-F6A240803BD9}" type="datetimeFigureOut">
               <a:rPr lang="it-IT" smtClean="0"/>
-              <a:t>10/02/2022</a:t>
+              <a:t>10/02/22</a:t>
             </a:fld>
             <a:endParaRPr lang="it-IT" dirty="0"/>
           </a:p>
@@ -676,7 +676,7 @@
           <a:p>
             <a:fld id="{FD2E41BA-F14B-49FC-83F3-F6A240803BD9}" type="datetimeFigureOut">
               <a:rPr lang="it-IT" smtClean="0"/>
-              <a:t>10/02/2022</a:t>
+              <a:t>10/02/22</a:t>
             </a:fld>
             <a:endParaRPr lang="it-IT" dirty="0"/>
           </a:p>
@@ -874,7 +874,7 @@
           <a:p>
             <a:fld id="{FD2E41BA-F14B-49FC-83F3-F6A240803BD9}" type="datetimeFigureOut">
               <a:rPr lang="it-IT" smtClean="0"/>
-              <a:t>10/02/2022</a:t>
+              <a:t>10/02/22</a:t>
             </a:fld>
             <a:endParaRPr lang="it-IT" dirty="0"/>
           </a:p>
@@ -1149,7 +1149,7 @@
           <a:p>
             <a:fld id="{FD2E41BA-F14B-49FC-83F3-F6A240803BD9}" type="datetimeFigureOut">
               <a:rPr lang="it-IT" smtClean="0"/>
-              <a:t>10/02/2022</a:t>
+              <a:t>10/02/22</a:t>
             </a:fld>
             <a:endParaRPr lang="it-IT" dirty="0"/>
           </a:p>
@@ -1414,7 +1414,7 @@
           <a:p>
             <a:fld id="{FD2E41BA-F14B-49FC-83F3-F6A240803BD9}" type="datetimeFigureOut">
               <a:rPr lang="it-IT" smtClean="0"/>
-              <a:t>10/02/2022</a:t>
+              <a:t>10/02/22</a:t>
             </a:fld>
             <a:endParaRPr lang="it-IT" dirty="0"/>
           </a:p>
@@ -1826,7 +1826,7 @@
           <a:p>
             <a:fld id="{FD2E41BA-F14B-49FC-83F3-F6A240803BD9}" type="datetimeFigureOut">
               <a:rPr lang="it-IT" smtClean="0"/>
-              <a:t>10/02/2022</a:t>
+              <a:t>10/02/22</a:t>
             </a:fld>
             <a:endParaRPr lang="it-IT" dirty="0"/>
           </a:p>
@@ -1967,7 +1967,7 @@
           <a:p>
             <a:fld id="{FD2E41BA-F14B-49FC-83F3-F6A240803BD9}" type="datetimeFigureOut">
               <a:rPr lang="it-IT" smtClean="0"/>
-              <a:t>10/02/2022</a:t>
+              <a:t>10/02/22</a:t>
             </a:fld>
             <a:endParaRPr lang="it-IT" dirty="0"/>
           </a:p>
@@ -2080,7 +2080,7 @@
           <a:p>
             <a:fld id="{FD2E41BA-F14B-49FC-83F3-F6A240803BD9}" type="datetimeFigureOut">
               <a:rPr lang="it-IT" smtClean="0"/>
-              <a:t>10/02/2022</a:t>
+              <a:t>10/02/22</a:t>
             </a:fld>
             <a:endParaRPr lang="it-IT" dirty="0"/>
           </a:p>
@@ -2391,7 +2391,7 @@
           <a:p>
             <a:fld id="{FD2E41BA-F14B-49FC-83F3-F6A240803BD9}" type="datetimeFigureOut">
               <a:rPr lang="it-IT" smtClean="0"/>
-              <a:t>10/02/2022</a:t>
+              <a:t>10/02/22</a:t>
             </a:fld>
             <a:endParaRPr lang="it-IT" dirty="0"/>
           </a:p>
@@ -2679,7 +2679,7 @@
           <a:p>
             <a:fld id="{FD2E41BA-F14B-49FC-83F3-F6A240803BD9}" type="datetimeFigureOut">
               <a:rPr lang="it-IT" smtClean="0"/>
-              <a:t>10/02/2022</a:t>
+              <a:t>10/02/22</a:t>
             </a:fld>
             <a:endParaRPr lang="it-IT" dirty="0"/>
           </a:p>
@@ -2920,7 +2920,7 @@
           <a:p>
             <a:fld id="{FD2E41BA-F14B-49FC-83F3-F6A240803BD9}" type="datetimeFigureOut">
               <a:rPr lang="it-IT" smtClean="0"/>
-              <a:t>10/02/2022</a:t>
+              <a:t>10/02/22</a:t>
             </a:fld>
             <a:endParaRPr lang="it-IT" dirty="0"/>
           </a:p>
@@ -3987,7 +3987,7 @@
           <a:p>
             <a:pPr algn="ctr"/>
             <a:r>
-              <a:rPr lang="en-US" sz="3600" kern="1200" dirty="0">
+              <a:rPr lang="en-US" sz="4000" kern="1200" dirty="0">
                 <a:solidFill>
                   <a:schemeClr val="tx1"/>
                 </a:solidFill>
@@ -4677,7 +4677,7 @@
           <a:p>
             <a:pPr algn="ctr"/>
             <a:r>
-              <a:rPr lang="en-US" sz="3600" kern="1200" dirty="0">
+              <a:rPr lang="en-US" sz="4000" kern="1200" dirty="0">
                 <a:solidFill>
                   <a:schemeClr val="tx1"/>
                 </a:solidFill>
@@ -5068,7 +5068,7 @@
         </p:blipFill>
         <p:spPr>
           <a:xfrm>
-            <a:off x="5295320" y="2087964"/>
+            <a:off x="5295322" y="1336498"/>
             <a:ext cx="6253212" cy="3751925"/>
           </a:xfrm>
           <a:prstGeom prst="rect">
@@ -5250,8 +5250,8 @@
         </p:nvSpPr>
         <p:spPr>
           <a:xfrm>
-            <a:off x="783771" y="1782981"/>
-            <a:ext cx="4329405" cy="1200329"/>
+            <a:off x="804692" y="1763902"/>
+            <a:ext cx="4329405" cy="3544560"/>
           </a:xfrm>
           <a:prstGeom prst="rect">
             <a:avLst/>
@@ -5264,9 +5264,29 @@
           </a:bodyPr>
           <a:lstStyle/>
           <a:p>
-            <a:r>
-              <a:rPr lang="it-IT" dirty="0"/>
-              <a:t>Abbiamo implementato la funzione GA attraverso R.</a:t>
+            <a:pPr>
+              <a:spcBef>
+                <a:spcPts val="1000"/>
+              </a:spcBef>
+            </a:pPr>
+            <a:r>
+              <a:rPr lang="it-IT" sz="2000" dirty="0">
+                <a:latin typeface="+mj-lt"/>
+              </a:rPr>
+              <a:t>Implementando la funzione GA abbiamo ottenuto il seguente risultato: i punti convergono tutti (circa) verso le coordinate  (11;5)</a:t>
+            </a:r>
+          </a:p>
+          <a:p>
+            <a:pPr>
+              <a:spcBef>
+                <a:spcPts val="1000"/>
+              </a:spcBef>
+            </a:pPr>
+            <a:r>
+              <a:rPr lang="it-IT" sz="2000" dirty="0">
+                <a:latin typeface="+mj-lt"/>
+              </a:rPr>
+              <a:t>Lo svantaggio di questo algoritmo è la poca chiarezza con quale metodo tra roulette e confronto fra coppie vengano scelti i geni trasmessi alla generazione successiva</a:t>
             </a:r>
           </a:p>
           <a:p>
@@ -5406,8 +5426,9 @@
           </a:bodyPr>
           <a:lstStyle/>
           <a:p>
-            <a:r>
-              <a:rPr lang="en-US" sz="3600" kern="1200" dirty="0">
+            <a:pPr algn="ctr"/>
+            <a:r>
+              <a:rPr lang="en-US" sz="4000" kern="1200" dirty="0">
                 <a:solidFill>
                   <a:schemeClr val="tx1"/>
                 </a:solidFill>
@@ -5436,8 +5457,8 @@
         </p:nvSpPr>
         <p:spPr>
           <a:xfrm>
-            <a:off x="643469" y="1782981"/>
-            <a:ext cx="4008384" cy="4393982"/>
+            <a:off x="643468" y="1782981"/>
+            <a:ext cx="4538131" cy="4393982"/>
           </a:xfrm>
           <a:prstGeom prst="rect">
             <a:avLst/>
@@ -5612,9 +5633,31 @@
             </a:lvl9pPr>
           </a:lstStyle>
           <a:p>
-            <a:r>
-              <a:rPr lang="en-US" sz="2000" dirty="0"/>
-              <a:t>Aaa</a:t>
+            <a:pPr marL="0" indent="0">
+              <a:lnSpc>
+                <a:spcPct val="100000"/>
+              </a:lnSpc>
+              <a:buNone/>
+            </a:pPr>
+            <a:r>
+              <a:rPr lang="en-US" sz="2000" dirty="0">
+                <a:latin typeface="+mj-lt"/>
+              </a:rPr>
+              <a:t>I risultati migliori sono stati ottenuti dall’algoritmo genetico che ha il vantaggio di essere semplice poichè i parametri non sono impostati a tentativi a differenza dell’algoritmo FDSA</a:t>
+            </a:r>
+          </a:p>
+          <a:p>
+            <a:pPr marL="0" indent="0">
+              <a:lnSpc>
+                <a:spcPct val="100000"/>
+              </a:lnSpc>
+              <a:buNone/>
+            </a:pPr>
+            <a:r>
+              <a:rPr lang="en-US" sz="2000" dirty="0">
+                <a:latin typeface="+mj-lt"/>
+              </a:rPr>
+              <a:t>L’algoritmo A ottiene risultati abbastanza soddisfacenti, a differenza dell’algoritmo B che rischia di convergere in punti di minimo o massimo locali</a:t>
             </a:r>
           </a:p>
         </p:txBody>
@@ -5801,7 +5844,7 @@
         </p:blipFill>
         <p:spPr>
           <a:xfrm>
-            <a:off x="5295320" y="2087964"/>
+            <a:off x="5181599" y="1321553"/>
             <a:ext cx="6253212" cy="3751925"/>
           </a:xfrm>
           <a:prstGeom prst="rect">
@@ -6294,7 +6337,7 @@
         </p:blipFill>
         <p:spPr>
           <a:xfrm>
-            <a:off x="5477523" y="2125214"/>
+            <a:off x="5477523" y="1779204"/>
             <a:ext cx="6071010" cy="3247991"/>
           </a:xfrm>
           <a:prstGeom prst="rect">
@@ -6478,7 +6521,7 @@
         </p:nvSpPr>
         <p:spPr>
           <a:xfrm>
-            <a:off x="643467" y="2125215"/>
+            <a:off x="643467" y="1805004"/>
             <a:ext cx="4338222" cy="3247991"/>
           </a:xfrm>
           <a:prstGeom prst="rect">
@@ -6738,7 +6781,7 @@
         </p:nvSpPr>
         <p:spPr>
           <a:xfrm>
-            <a:off x="6096000" y="2920753"/>
+            <a:off x="6108495" y="2675042"/>
             <a:ext cx="4956699" cy="1926455"/>
           </a:xfrm>
           <a:prstGeom prst="rect">
@@ -7509,7 +7552,7 @@
               <a:rPr lang="it-IT" sz="2000" dirty="0">
                 <a:latin typeface="+mj-lt"/>
               </a:rPr>
-              <a:t>), che durante le scene si muovono secondo un </a:t>
+              <a:t>) che durante le scene si muovono secondo un </a:t>
             </a:r>
             <a:r>
               <a:rPr lang="it-IT" sz="2000" b="1" dirty="0">
@@ -8137,6 +8180,10 @@
           <a:p>
             <a:pPr algn="ctr"/>
             <a:r>
+              <a:rPr lang="en-US" sz="4000" dirty="0"/>
+              <a:t>F</a:t>
+            </a:r>
+            <a:r>
               <a:rPr lang="en-US" sz="4000" kern="1200" dirty="0">
                 <a:solidFill>
                   <a:schemeClr val="tx1"/>
@@ -8145,8 +8192,20 @@
                 <a:ea typeface="+mj-ea"/>
                 <a:cs typeface="+mj-cs"/>
               </a:rPr>
-              <a:t>La funzione di costo</a:t>
-            </a:r>
+              <a:t>unzione </a:t>
+            </a:r>
+            <a:r>
+              <a:rPr lang="en-US" sz="4000" dirty="0"/>
+              <a:t>obiettivo</a:t>
+            </a:r>
+            <a:endParaRPr lang="en-US" sz="4000" kern="1200" dirty="0">
+              <a:solidFill>
+                <a:schemeClr val="tx1"/>
+              </a:solidFill>
+              <a:latin typeface="+mj-lt"/>
+              <a:ea typeface="+mj-ea"/>
+              <a:cs typeface="+mj-cs"/>
+            </a:endParaRPr>
           </a:p>
         </p:txBody>
       </p:sp>
@@ -8166,8 +8225,8 @@
         </p:nvSpPr>
         <p:spPr>
           <a:xfrm>
-            <a:off x="643469" y="1782981"/>
-            <a:ext cx="10905064" cy="4393982"/>
+            <a:off x="643467" y="1960744"/>
+            <a:ext cx="10905064" cy="2853523"/>
           </a:xfrm>
           <a:prstGeom prst="rect">
             <a:avLst/>
@@ -9253,7 +9312,7 @@
           <a:p>
             <a:pPr algn="ctr"/>
             <a:r>
-              <a:rPr lang="en-US" sz="3600" kern="1200" dirty="0">
+              <a:rPr lang="en-US" sz="4000" kern="1200" dirty="0">
                 <a:solidFill>
                   <a:schemeClr val="tx1"/>
                 </a:solidFill>
@@ -9459,25 +9518,33 @@
           </a:lstStyle>
           <a:p>
             <a:r>
-              <a:rPr lang="en-US" sz="2000" dirty="0"/>
+              <a:rPr lang="en-US" sz="2000" dirty="0">
+                <a:latin typeface="+mj-lt"/>
+              </a:rPr>
               <a:t>Scegliere un guess iniziale in modo casuale</a:t>
             </a:r>
           </a:p>
           <a:p>
             <a:r>
-              <a:rPr lang="en-US" sz="2000" dirty="0"/>
+              <a:rPr lang="en-US" sz="2000" dirty="0">
+                <a:latin typeface="+mj-lt"/>
+              </a:rPr>
               <a:t>A ogni passo generare un nuovo guess casuale all’interno del dominio </a:t>
             </a:r>
           </a:p>
           <a:p>
             <a:r>
-              <a:rPr lang="en-US" sz="2000" dirty="0"/>
+              <a:rPr lang="en-US" sz="2000" dirty="0">
+                <a:latin typeface="+mj-lt"/>
+              </a:rPr>
               <a:t>Confrontare la funzione di costo calcolata nel nuovo candidato con la funzione di costo vecchia</a:t>
             </a:r>
           </a:p>
           <a:p>
             <a:r>
-              <a:rPr lang="en-US" sz="2000" dirty="0"/>
+              <a:rPr lang="en-US" sz="2000" dirty="0">
+                <a:latin typeface="+mj-lt"/>
+              </a:rPr>
               <a:t>Se il costo è inferiore aggiornare il parametro</a:t>
             </a:r>
           </a:p>
@@ -9848,7 +9915,7 @@
         <p:spPr>
           <a:xfrm>
             <a:off x="1014060" y="5141798"/>
-            <a:ext cx="10205230" cy="923330"/>
+            <a:ext cx="10205230" cy="1015663"/>
           </a:xfrm>
           <a:prstGeom prst="rect">
             <a:avLst/>
@@ -9862,8 +9929,10 @@
           <a:lstStyle/>
           <a:p>
             <a:r>
-              <a:rPr lang="it-IT" dirty="0"/>
-              <a:t>Come si può notare dal grafico i punti in cui posizionare il terzo microfono convergono quasi tutti nella zona centrale del palco. Una buona soluzione per scegliere solo un punto potrebbe essere quella di scegliere il punto centrale appartenente a questa nuvola di punti.</a:t>
+              <a:rPr lang="it-IT" sz="2000" dirty="0">
+                <a:latin typeface="+mj-lt"/>
+              </a:rPr>
+              <a:t>Come si può notare dal grafico i punti in cui posizionare il terzo microfono convergono quasi tutti nella zona centrale del palco. Una buona soluzione per scegliere solo un punto potrebbe essere quella di scegliere il punto centrale appartenente a questa nuvola di punti</a:t>
             </a:r>
           </a:p>
         </p:txBody>
@@ -9999,7 +10068,7 @@
           <a:p>
             <a:pPr algn="ctr"/>
             <a:r>
-              <a:rPr lang="en-US" sz="3600" kern="1200" dirty="0">
+              <a:rPr lang="en-US" sz="4000" kern="1200" dirty="0">
                 <a:solidFill>
                   <a:schemeClr val="tx1"/>
                 </a:solidFill>
@@ -10205,14 +10274,26 @@
           </a:lstStyle>
           <a:p>
             <a:r>
-              <a:rPr lang="en-US" sz="2000" dirty="0"/>
+              <a:rPr lang="en-US" sz="2000" dirty="0">
+                <a:latin typeface="+mj-lt"/>
+              </a:rPr>
               <a:t>Algoritmo simile al precedente con una differenza: a partire da un guess iniziale scelto in modo casuale tendiamo a non spostarci troppo</a:t>
             </a:r>
           </a:p>
           <a:p>
             <a:r>
-              <a:rPr lang="en-US" sz="2000" dirty="0"/>
+              <a:rPr lang="en-US" sz="2000" dirty="0">
+                <a:latin typeface="+mj-lt"/>
+              </a:rPr>
               <a:t>Questo teoricamente dovrebbe consentire di convergere più velocemente al punto di minimo più vicino al guess iniziale introdotto</a:t>
+            </a:r>
+          </a:p>
+          <a:p>
+            <a:r>
+              <a:rPr lang="en-US" sz="2000" dirty="0">
+                <a:latin typeface="+mj-lt"/>
+              </a:rPr>
+              <a:t>Con questo metodo si rischia di cadere in un minimo locale pensando che esso sia globale</a:t>
             </a:r>
           </a:p>
         </p:txBody>
@@ -10582,7 +10663,7 @@
         <p:spPr>
           <a:xfrm>
             <a:off x="1014060" y="5141798"/>
-            <a:ext cx="10205230" cy="646331"/>
+            <a:ext cx="10205230" cy="1015663"/>
           </a:xfrm>
           <a:prstGeom prst="rect">
             <a:avLst/>
@@ -10596,8 +10677,10 @@
           <a:lstStyle/>
           <a:p>
             <a:r>
-              <a:rPr lang="it-IT" dirty="0"/>
-              <a:t>Come si può notare dal grafico i punti sono molto dispersi, questo perché se il primo punto si discosta molto dal punto di ottimo</a:t>
+              <a:rPr lang="it-IT" sz="2000" dirty="0">
+                <a:latin typeface="+mj-lt"/>
+              </a:rPr>
+              <a:t>Come si può notare dal grafico i punti sono molto dispersi, questo perché se il primo punto si discosta molto dal punto di ottimo allora è difficile che i successivi, allontanandosi poco da quello, arrivino all’ottimo</a:t>
             </a:r>
           </a:p>
         </p:txBody>
@@ -10733,7 +10816,7 @@
           <a:p>
             <a:pPr algn="ctr"/>
             <a:r>
-              <a:rPr lang="en-US" sz="3600" kern="1200" dirty="0">
+              <a:rPr lang="en-US" sz="4000" kern="1200" dirty="0">
                 <a:solidFill>
                   <a:schemeClr val="tx1"/>
                 </a:solidFill>
@@ -10762,8 +10845,8 @@
         </p:nvSpPr>
         <p:spPr>
           <a:xfrm>
-            <a:off x="643469" y="1782981"/>
-            <a:ext cx="4008384" cy="4393982"/>
+            <a:off x="590453" y="1577515"/>
+            <a:ext cx="4704866" cy="4393982"/>
           </a:xfrm>
           <a:prstGeom prst="rect">
             <a:avLst/>
@@ -10942,72 +11025,10 @@
               <a:buNone/>
             </a:pPr>
             <a:r>
-              <a:rPr lang="en-US" sz="2000" dirty="0"/>
-              <a:t>Per </a:t>
-            </a:r>
-            <a:r>
-              <a:rPr lang="en-US" sz="2000" dirty="0" err="1"/>
-              <a:t>superare</a:t>
-            </a:r>
-            <a:r>
-              <a:rPr lang="en-US" sz="2000" dirty="0"/>
-              <a:t> I </a:t>
-            </a:r>
-            <a:r>
-              <a:rPr lang="en-US" sz="2000" dirty="0" err="1"/>
-              <a:t>limiti</a:t>
-            </a:r>
-            <a:r>
-              <a:rPr lang="en-US" sz="2000" dirty="0"/>
-              <a:t> </a:t>
-            </a:r>
-            <a:r>
-              <a:rPr lang="en-US" sz="2000" dirty="0" err="1"/>
-              <a:t>dei</a:t>
-            </a:r>
-            <a:r>
-              <a:rPr lang="en-US" sz="2000" dirty="0"/>
-              <a:t> due </a:t>
-            </a:r>
-            <a:r>
-              <a:rPr lang="en-US" sz="2000" dirty="0" err="1"/>
-              <a:t>metodi</a:t>
-            </a:r>
-            <a:r>
-              <a:rPr lang="en-US" sz="2000" dirty="0"/>
-              <a:t> </a:t>
-            </a:r>
-            <a:r>
-              <a:rPr lang="en-US" sz="2000" dirty="0" err="1"/>
-              <a:t>abbiamo</a:t>
-            </a:r>
-            <a:r>
-              <a:rPr lang="en-US" sz="2000" dirty="0"/>
-              <a:t> </a:t>
-            </a:r>
-            <a:r>
-              <a:rPr lang="en-US" sz="2000" dirty="0" err="1"/>
-              <a:t>provato</a:t>
-            </a:r>
-            <a:r>
-              <a:rPr lang="en-US" sz="2000" dirty="0"/>
-              <a:t> ad </a:t>
-            </a:r>
-            <a:r>
-              <a:rPr lang="en-US" sz="2000" dirty="0" err="1"/>
-              <a:t>implementarli</a:t>
-            </a:r>
-            <a:r>
-              <a:rPr lang="en-US" sz="2000" dirty="0"/>
-              <a:t> </a:t>
-            </a:r>
-            <a:r>
-              <a:rPr lang="en-US" sz="2000" dirty="0" err="1"/>
-              <a:t>consecutivamente</a:t>
-            </a:r>
-            <a:r>
-              <a:rPr lang="en-US" sz="2000" dirty="0"/>
-              <a:t>. </a:t>
+              <a:rPr lang="en-US" sz="2000" dirty="0">
+                <a:latin typeface="+mj-lt"/>
+              </a:rPr>
+              <a:t>Per superare i limiti dei due metodi abbiamo provato ad implementarli consecutivamente: attraverso l’algoritmo A abbiamo esplorato la funzione per avvicinarci all’ottimo globale</a:t>
             </a:r>
           </a:p>
           <a:p>
@@ -11015,205 +11036,10 @@
               <a:buNone/>
             </a:pPr>
             <a:r>
-              <a:rPr lang="en-US" sz="2000" dirty="0" err="1"/>
-              <a:t>Quindi</a:t>
-            </a:r>
-            <a:r>
-              <a:rPr lang="en-US" sz="2000" dirty="0"/>
-              <a:t> </a:t>
-            </a:r>
-            <a:r>
-              <a:rPr lang="en-US" sz="2000" dirty="0" err="1"/>
-              <a:t>attraverso</a:t>
-            </a:r>
-            <a:r>
-              <a:rPr lang="en-US" sz="2000" dirty="0"/>
-              <a:t> </a:t>
-            </a:r>
-            <a:r>
-              <a:rPr lang="en-US" sz="2000" dirty="0" err="1"/>
-              <a:t>l’algoritmo</a:t>
-            </a:r>
-            <a:r>
-              <a:rPr lang="en-US" sz="2000" dirty="0"/>
-              <a:t> A </a:t>
-            </a:r>
-            <a:r>
-              <a:rPr lang="en-US" sz="2000" dirty="0" err="1"/>
-              <a:t>abbiamo</a:t>
-            </a:r>
-            <a:r>
-              <a:rPr lang="en-US" sz="2000" dirty="0"/>
-              <a:t> </a:t>
-            </a:r>
-            <a:r>
-              <a:rPr lang="en-US" sz="2000" dirty="0" err="1"/>
-              <a:t>esplorato</a:t>
-            </a:r>
-            <a:r>
-              <a:rPr lang="en-US" sz="2000" dirty="0"/>
-              <a:t> la </a:t>
-            </a:r>
-            <a:r>
-              <a:rPr lang="en-US" sz="2000" dirty="0" err="1"/>
-              <a:t>funzione</a:t>
-            </a:r>
-            <a:r>
-              <a:rPr lang="en-US" sz="2000" dirty="0"/>
-              <a:t> per </a:t>
-            </a:r>
-            <a:r>
-              <a:rPr lang="en-US" sz="2000" dirty="0" err="1"/>
-              <a:t>avvicinarci</a:t>
-            </a:r>
-            <a:r>
-              <a:rPr lang="en-US" sz="2000" dirty="0"/>
-              <a:t> </a:t>
-            </a:r>
-            <a:r>
-              <a:rPr lang="en-US" sz="2000" dirty="0" err="1"/>
-              <a:t>all’ottimo</a:t>
-            </a:r>
-            <a:r>
-              <a:rPr lang="en-US" sz="2000" dirty="0"/>
-              <a:t> </a:t>
-            </a:r>
-            <a:r>
-              <a:rPr lang="en-US" sz="2000" dirty="0" err="1"/>
-              <a:t>globale</a:t>
-            </a:r>
-            <a:r>
-              <a:rPr lang="en-US" sz="2000" dirty="0"/>
-              <a:t>.</a:t>
-            </a:r>
-          </a:p>
-          <a:p>
-            <a:pPr marL="0" indent="0">
-              <a:buNone/>
-            </a:pPr>
-            <a:r>
-              <a:rPr lang="en-US" sz="2000" dirty="0"/>
-              <a:t>Sui </a:t>
-            </a:r>
-            <a:r>
-              <a:rPr lang="en-US" sz="2000" dirty="0" err="1"/>
-              <a:t>risultati</a:t>
-            </a:r>
-            <a:r>
-              <a:rPr lang="en-US" sz="2000" dirty="0"/>
-              <a:t> </a:t>
-            </a:r>
-            <a:r>
-              <a:rPr lang="en-US" sz="2000" dirty="0" err="1"/>
-              <a:t>ottenuti</a:t>
-            </a:r>
-            <a:r>
-              <a:rPr lang="en-US" sz="2000" dirty="0"/>
-              <a:t> </a:t>
-            </a:r>
-            <a:r>
-              <a:rPr lang="en-US" sz="2000" dirty="0" err="1"/>
-              <a:t>attraverso</a:t>
-            </a:r>
-            <a:r>
-              <a:rPr lang="en-US" sz="2000" dirty="0"/>
-              <a:t> </a:t>
-            </a:r>
-            <a:r>
-              <a:rPr lang="en-US" sz="2000" dirty="0" err="1"/>
-              <a:t>l’algoritmo</a:t>
-            </a:r>
-            <a:r>
-              <a:rPr lang="en-US" sz="2000" dirty="0"/>
-              <a:t> A, </a:t>
-            </a:r>
-            <a:r>
-              <a:rPr lang="en-US" sz="2000" dirty="0" err="1"/>
-              <a:t>abbiamo</a:t>
-            </a:r>
-            <a:r>
-              <a:rPr lang="en-US" sz="2000" dirty="0"/>
-              <a:t> </a:t>
-            </a:r>
-            <a:r>
-              <a:rPr lang="en-US" sz="2000" dirty="0" err="1"/>
-              <a:t>implementato</a:t>
-            </a:r>
-            <a:r>
-              <a:rPr lang="en-US" sz="2000" dirty="0"/>
-              <a:t> </a:t>
-            </a:r>
-            <a:r>
-              <a:rPr lang="en-US" sz="2000" dirty="0" err="1"/>
-              <a:t>l’algoritmo</a:t>
-            </a:r>
-            <a:r>
-              <a:rPr lang="en-US" sz="2000" dirty="0"/>
-              <a:t> B per </a:t>
-            </a:r>
-            <a:r>
-              <a:rPr lang="en-US" sz="2000" dirty="0" err="1"/>
-              <a:t>verificare</a:t>
-            </a:r>
-            <a:r>
-              <a:rPr lang="en-US" sz="2000" dirty="0"/>
-              <a:t> se, </a:t>
-            </a:r>
-            <a:r>
-              <a:rPr lang="en-US" sz="2000" dirty="0" err="1"/>
-              <a:t>esplorando</a:t>
-            </a:r>
-            <a:r>
-              <a:rPr lang="en-US" sz="2000" dirty="0"/>
-              <a:t> </a:t>
-            </a:r>
-            <a:r>
-              <a:rPr lang="en-US" sz="2000" dirty="0" err="1"/>
-              <a:t>l’intorno</a:t>
-            </a:r>
-            <a:r>
-              <a:rPr lang="en-US" sz="2000" dirty="0"/>
-              <a:t> di </a:t>
-            </a:r>
-            <a:r>
-              <a:rPr lang="en-US" sz="2000" dirty="0" err="1"/>
-              <a:t>tali</a:t>
-            </a:r>
-            <a:r>
-              <a:rPr lang="en-US" sz="2000" dirty="0"/>
-              <a:t> </a:t>
-            </a:r>
-            <a:r>
-              <a:rPr lang="en-US" sz="2000" dirty="0" err="1"/>
-              <a:t>punti</a:t>
-            </a:r>
-            <a:r>
-              <a:rPr lang="en-US" sz="2000" dirty="0"/>
-              <a:t>, I </a:t>
-            </a:r>
-            <a:r>
-              <a:rPr lang="en-US" sz="2000" dirty="0" err="1"/>
-              <a:t>risultati</a:t>
-            </a:r>
-            <a:r>
-              <a:rPr lang="en-US" sz="2000" dirty="0"/>
-              <a:t> </a:t>
-            </a:r>
-            <a:r>
-              <a:rPr lang="en-US" sz="2000" dirty="0" err="1"/>
-              <a:t>convergessero</a:t>
-            </a:r>
-            <a:r>
-              <a:rPr lang="en-US" sz="2000" dirty="0"/>
-              <a:t> in unica </a:t>
-            </a:r>
-            <a:r>
-              <a:rPr lang="en-US" sz="2000" dirty="0" err="1"/>
-              <a:t>soluzione</a:t>
-            </a:r>
-            <a:r>
-              <a:rPr lang="en-US" sz="2000" dirty="0"/>
-              <a:t>.</a:t>
+              <a:rPr lang="en-US" sz="2000" dirty="0">
+                <a:latin typeface="+mj-lt"/>
+              </a:rPr>
+              <a:t>Partendo dai risultati ottenuti abbiamo implementato l’algoritmo B per verificare se, esplorando l’intorno di tali punti, i risultati convergessero con esattezza nel punto di ottimo</a:t>
             </a:r>
           </a:p>
         </p:txBody>

</xml_diff>